<commit_message>
update tests and functions for new templates
</commit_message>
<xml_diff>
--- a/inst/extdata/template_2022.pptx
+++ b/inst/extdata/template_2022.pptx
@@ -203,7 +203,7 @@
           <a:p>
             <a:fld id="{E6375376-077A-8F42-9E71-155E70FB596E}" type="datetimeFigureOut">
               <a:rPr lang="en-US" smtClean="0"/>
-              <a:t>12/28/22</a:t>
+              <a:t>5/26/23</a:t>
             </a:fld>
             <a:endParaRPr lang="en-US"/>
           </a:p>
@@ -1153,7 +1153,7 @@
           <a:p>
             <a:fld id="{184C34C6-D93D-964F-98F1-8B05274CB5BF}" type="datetimeFigureOut">
               <a:rPr lang="en-US" smtClean="0"/>
-              <a:t>12/28/22</a:t>
+              <a:t>5/26/23</a:t>
             </a:fld>
             <a:endParaRPr lang="en-US"/>
           </a:p>
@@ -1374,7 +1374,7 @@
           <a:p>
             <a:fld id="{184C34C6-D93D-964F-98F1-8B05274CB5BF}" type="datetimeFigureOut">
               <a:rPr lang="en-US" smtClean="0"/>
-              <a:t>12/28/22</a:t>
+              <a:t>5/26/23</a:t>
             </a:fld>
             <a:endParaRPr lang="en-US" dirty="0"/>
           </a:p>
@@ -1698,7 +1698,7 @@
           <a:p>
             <a:fld id="{184C34C6-D93D-964F-98F1-8B05274CB5BF}" type="datetimeFigureOut">
               <a:rPr lang="en-US" smtClean="0"/>
-              <a:t>12/28/22</a:t>
+              <a:t>5/26/23</a:t>
             </a:fld>
             <a:endParaRPr lang="en-US" dirty="0"/>
           </a:p>
@@ -2215,7 +2215,7 @@
           <a:p>
             <a:fld id="{184C34C6-D93D-964F-98F1-8B05274CB5BF}" type="datetimeFigureOut">
               <a:rPr lang="en-US" smtClean="0"/>
-              <a:t>12/28/22</a:t>
+              <a:t>5/26/23</a:t>
             </a:fld>
             <a:endParaRPr lang="en-US" dirty="0"/>
           </a:p>
@@ -2570,8 +2570,8 @@
         </p:nvSpPr>
         <p:spPr>
           <a:xfrm>
-            <a:off x="378478" y="1312069"/>
-            <a:ext cx="11398531" cy="335156"/>
+            <a:off x="378478" y="1192801"/>
+            <a:ext cx="11398531" cy="306710"/>
           </a:xfrm>
         </p:spPr>
         <p:txBody>
@@ -2612,13 +2612,13 @@
         </p:nvSpPr>
         <p:spPr>
           <a:xfrm>
-            <a:off x="371475" y="6239781"/>
-            <a:ext cx="10662320" cy="455613"/>
+            <a:off x="371475" y="6609900"/>
+            <a:ext cx="10662320" cy="204762"/>
           </a:xfrm>
         </p:spPr>
         <p:txBody>
           <a:bodyPr>
-            <a:normAutofit/>
+            <a:noAutofit/>
           </a:bodyPr>
           <a:lstStyle>
             <a:lvl1pPr marL="0" indent="0">
@@ -2638,10 +2638,10 @@
       </p:sp>
       <p:sp>
         <p:nvSpPr>
-          <p:cNvPr id="51" name="Content Placeholder 3">
+          <p:cNvPr id="3" name="Content Placeholder 3">
             <a:extLst>
               <a:ext uri="{FF2B5EF4-FFF2-40B4-BE49-F238E27FC236}">
-                <a16:creationId xmlns:a16="http://schemas.microsoft.com/office/drawing/2014/main" id="{BA796F9D-91C8-8817-47C8-D1B3DB6BCCE5}"/>
+                <a16:creationId xmlns:a16="http://schemas.microsoft.com/office/drawing/2014/main" id="{308335A6-FEDB-3236-69EC-4D55F9E69E71}"/>
               </a:ext>
             </a:extLst>
           </p:cNvPr>
@@ -2649,19 +2649,52 @@
             <a:spLocks noGrp="1"/>
           </p:cNvSpPr>
           <p:nvPr>
-            <p:ph type="chart" sz="quarter" idx="12"/>
-          </p:nvPr>
-        </p:nvSpPr>
-        <p:spPr>
-          <a:xfrm>
-            <a:off x="371475" y="1808163"/>
-            <a:ext cx="11412538" cy="4284662"/>
+            <p:ph sz="quarter" idx="13"/>
+          </p:nvPr>
+        </p:nvSpPr>
+        <p:spPr>
+          <a:xfrm>
+            <a:off x="536713" y="1517569"/>
+            <a:ext cx="11002617" cy="5068887"/>
           </a:xfrm>
         </p:spPr>
         <p:txBody>
           <a:bodyPr/>
           <a:lstStyle/>
           <a:p>
+            <a:pPr lvl="0"/>
+            <a:r>
+              <a:rPr lang="en-GB"/>
+              <a:t>Click to edit Master text styles</a:t>
+            </a:r>
+          </a:p>
+          <a:p>
+            <a:pPr lvl="1"/>
+            <a:r>
+              <a:rPr lang="en-GB"/>
+              <a:t>Second level</a:t>
+            </a:r>
+          </a:p>
+          <a:p>
+            <a:pPr lvl="2"/>
+            <a:r>
+              <a:rPr lang="en-GB"/>
+              <a:t>Third level</a:t>
+            </a:r>
+          </a:p>
+          <a:p>
+            <a:pPr lvl="3"/>
+            <a:r>
+              <a:rPr lang="en-GB"/>
+              <a:t>Fourth level</a:t>
+            </a:r>
+          </a:p>
+          <a:p>
+            <a:pPr lvl="4"/>
+            <a:r>
+              <a:rPr lang="en-GB"/>
+              <a:t>Fifth level</a:t>
+            </a:r>
             <a:endParaRPr lang="en-AU"/>
           </a:p>
         </p:txBody>
@@ -2867,7 +2900,7 @@
           <a:p>
             <a:fld id="{184C34C6-D93D-964F-98F1-8B05274CB5BF}" type="datetimeFigureOut">
               <a:rPr lang="en-AU" noProof="0" smtClean="0"/>
-              <a:t>28/12/2022</a:t>
+              <a:t>26/5/2023</a:t>
             </a:fld>
             <a:endParaRPr lang="en-AU" noProof="0"/>
           </a:p>

</xml_diff>